<commit_message>
Update slides with links and "about us" info.
</commit_message>
<xml_diff>
--- a/ppt/Golf Refactoryzacyjny - Pragmatists - Warjsawa 2013.pptx
+++ b/ppt/Golf Refactoryzacyjny - Pragmatists - Warjsawa 2013.pptx
@@ -208,7 +208,7 @@
           <a:p>
             <a:fld id="{2017B072-2BBC-48B4-ACB1-DC1206F58A8D}" type="datetimeFigureOut">
               <a:rPr lang="pl-PL" smtClean="0"/>
-              <a:t>2013-10-11</a:t>
+              <a:t>2013-10-14</a:t>
             </a:fld>
             <a:endParaRPr lang="pl-PL"/>
           </a:p>
@@ -709,7 +709,7 @@
           <a:p>
             <a:fld id="{8CC547FA-6B4E-4510-AD71-7AB9BD14AC17}" type="datetimeFigureOut">
               <a:rPr lang="pl-PL" smtClean="0"/>
-              <a:t>2013-10-11</a:t>
+              <a:t>2013-10-14</a:t>
             </a:fld>
             <a:endParaRPr lang="pl-PL"/>
           </a:p>
@@ -886,7 +886,7 @@
           <a:p>
             <a:fld id="{8CC547FA-6B4E-4510-AD71-7AB9BD14AC17}" type="datetimeFigureOut">
               <a:rPr lang="pl-PL" smtClean="0"/>
-              <a:t>2013-10-11</a:t>
+              <a:t>2013-10-14</a:t>
             </a:fld>
             <a:endParaRPr lang="pl-PL"/>
           </a:p>
@@ -1066,7 +1066,7 @@
           <a:p>
             <a:fld id="{8CC547FA-6B4E-4510-AD71-7AB9BD14AC17}" type="datetimeFigureOut">
               <a:rPr lang="pl-PL" smtClean="0"/>
-              <a:t>2013-10-11</a:t>
+              <a:t>2013-10-14</a:t>
             </a:fld>
             <a:endParaRPr lang="pl-PL"/>
           </a:p>
@@ -1236,7 +1236,7 @@
           <a:p>
             <a:fld id="{8CC547FA-6B4E-4510-AD71-7AB9BD14AC17}" type="datetimeFigureOut">
               <a:rPr lang="pl-PL" smtClean="0"/>
-              <a:t>2013-10-11</a:t>
+              <a:t>2013-10-14</a:t>
             </a:fld>
             <a:endParaRPr lang="pl-PL"/>
           </a:p>
@@ -1489,7 +1489,7 @@
           <a:p>
             <a:fld id="{8CC547FA-6B4E-4510-AD71-7AB9BD14AC17}" type="datetimeFigureOut">
               <a:rPr lang="pl-PL" smtClean="0"/>
-              <a:t>2013-10-11</a:t>
+              <a:t>2013-10-14</a:t>
             </a:fld>
             <a:endParaRPr lang="pl-PL"/>
           </a:p>
@@ -1777,7 +1777,7 @@
           <a:p>
             <a:fld id="{8CC547FA-6B4E-4510-AD71-7AB9BD14AC17}" type="datetimeFigureOut">
               <a:rPr lang="pl-PL" smtClean="0"/>
-              <a:t>2013-10-11</a:t>
+              <a:t>2013-10-14</a:t>
             </a:fld>
             <a:endParaRPr lang="pl-PL"/>
           </a:p>
@@ -2199,7 +2199,7 @@
           <a:p>
             <a:fld id="{8CC547FA-6B4E-4510-AD71-7AB9BD14AC17}" type="datetimeFigureOut">
               <a:rPr lang="pl-PL" smtClean="0"/>
-              <a:t>2013-10-11</a:t>
+              <a:t>2013-10-14</a:t>
             </a:fld>
             <a:endParaRPr lang="pl-PL"/>
           </a:p>
@@ -2317,7 +2317,7 @@
           <a:p>
             <a:fld id="{8CC547FA-6B4E-4510-AD71-7AB9BD14AC17}" type="datetimeFigureOut">
               <a:rPr lang="pl-PL" smtClean="0"/>
-              <a:t>2013-10-11</a:t>
+              <a:t>2013-10-14</a:t>
             </a:fld>
             <a:endParaRPr lang="pl-PL"/>
           </a:p>
@@ -2412,7 +2412,7 @@
           <a:p>
             <a:fld id="{8CC547FA-6B4E-4510-AD71-7AB9BD14AC17}" type="datetimeFigureOut">
               <a:rPr lang="pl-PL" smtClean="0"/>
-              <a:t>2013-10-11</a:t>
+              <a:t>2013-10-14</a:t>
             </a:fld>
             <a:endParaRPr lang="pl-PL"/>
           </a:p>
@@ -2689,7 +2689,7 @@
           <a:p>
             <a:fld id="{8CC547FA-6B4E-4510-AD71-7AB9BD14AC17}" type="datetimeFigureOut">
               <a:rPr lang="pl-PL" smtClean="0"/>
-              <a:t>2013-10-11</a:t>
+              <a:t>2013-10-14</a:t>
             </a:fld>
             <a:endParaRPr lang="pl-PL"/>
           </a:p>
@@ -2942,7 +2942,7 @@
           <a:p>
             <a:fld id="{8CC547FA-6B4E-4510-AD71-7AB9BD14AC17}" type="datetimeFigureOut">
               <a:rPr lang="pl-PL" smtClean="0"/>
-              <a:t>2013-10-11</a:t>
+              <a:t>2013-10-14</a:t>
             </a:fld>
             <a:endParaRPr lang="pl-PL"/>
           </a:p>
@@ -3257,7 +3257,7 @@
           <a:p>
             <a:fld id="{8CC547FA-6B4E-4510-AD71-7AB9BD14AC17}" type="datetimeFigureOut">
               <a:rPr lang="pl-PL" smtClean="0"/>
-              <a:t>2013-10-11</a:t>
+              <a:t>2013-10-14</a:t>
             </a:fld>
             <a:endParaRPr lang="pl-PL"/>
           </a:p>
@@ -4134,11 +4134,7 @@
             </a:pPr>
             <a:r>
               <a:rPr lang="pl-PL"/>
-              <a:t>Zwycięski zespół – </a:t>
-            </a:r>
-            <a:r>
-              <a:rPr lang="pl-PL"/>
-              <a:t>licencje </a:t>
+              <a:t>Zwycięski zespół – licencje </a:t>
             </a:r>
             <a:r>
               <a:rPr lang="pl-PL" smtClean="0"/>
@@ -4853,7 +4849,9 @@
         </p:nvSpPr>
         <p:spPr/>
         <p:txBody>
-          <a:bodyPr/>
+          <a:bodyPr>
+            <a:normAutofit/>
+          </a:bodyPr>
           <a:lstStyle/>
           <a:p>
             <a:r>
@@ -4864,39 +4862,19 @@
           <a:p>
             <a:r>
               <a:rPr lang="pl-PL" smtClean="0"/>
-              <a:t>programowanie,</a:t>
-            </a:r>
-            <a:br>
-              <a:rPr lang="pl-PL" smtClean="0"/>
-            </a:br>
-            <a:r>
-              <a:rPr lang="pl-PL" smtClean="0"/>
-              <a:t>szkolenia,</a:t>
-            </a:r>
-            <a:br>
-              <a:rPr lang="pl-PL" smtClean="0"/>
-            </a:br>
-            <a:r>
-              <a:rPr lang="pl-PL" smtClean="0"/>
-              <a:t>coaching,</a:t>
-            </a:r>
-            <a:br>
-              <a:rPr lang="pl-PL" smtClean="0"/>
-            </a:br>
-            <a:r>
-              <a:rPr lang="pl-PL" smtClean="0"/>
-              <a:t>prowadzenie </a:t>
+              <a:t>developer</a:t>
             </a:r>
             <a:r>
               <a:rPr lang="pl-PL"/>
-              <a:t>zespołu</a:t>
-            </a:r>
-          </a:p>
-          <a:p>
-            <a:r>
-              <a:rPr lang="pl-PL"/>
-              <a:t>aktualnie: developer, coach @Pragmatists</a:t>
-            </a:r>
+              <a:t>, coach @</a:t>
+            </a:r>
+            <a:r>
+              <a:rPr lang="pl-PL">
+                <a:hlinkClick r:id="rId2"/>
+              </a:rPr>
+              <a:t>Pragmatists</a:t>
+            </a:r>
+            <a:endParaRPr lang="pl-PL"/>
           </a:p>
           <a:p>
             <a:r>
@@ -4907,8 +4885,8 @@
               <a:rPr lang="pl-PL"/>
             </a:br>
             <a:r>
-              <a:rPr lang="pl-PL">
-                <a:hlinkClick r:id="rId2" action="ppaction://hlinkfile"/>
+              <a:rPr lang="pl-PL" smtClean="0">
+                <a:hlinkClick r:id="rId3"/>
               </a:rPr>
               <a:t>agile-elearning.pl</a:t>
             </a:r>
@@ -4950,11 +4928,26 @@
             <p:ph sz="quarter" idx="4"/>
           </p:nvPr>
         </p:nvSpPr>
-        <p:spPr/>
-        <p:txBody>
-          <a:bodyPr/>
-          <a:lstStyle/>
-          <a:p>
+        <p:spPr>
+          <a:xfrm>
+            <a:off x="6084888" y="2174875"/>
+            <a:ext cx="2601912" cy="3951288"/>
+          </a:xfrm>
+        </p:spPr>
+        <p:txBody>
+          <a:bodyPr/>
+          <a:lstStyle/>
+          <a:p>
+            <a:r>
+              <a:rPr lang="pl-PL" smtClean="0"/>
+              <a:t>Doświadczony programista Java</a:t>
+            </a:r>
+          </a:p>
+          <a:p>
+            <a:r>
+              <a:rPr lang="pl-PL" smtClean="0"/>
+              <a:t>Praktykuje TDD i Pair Programming</a:t>
+            </a:r>
             <a:endParaRPr lang="pl-PL"/>
           </a:p>
         </p:txBody>
@@ -4968,7 +4961,7 @@
           <p:nvPr/>
         </p:nvPicPr>
         <p:blipFill>
-          <a:blip r:embed="rId3" cstate="print">
+          <a:blip r:embed="rId4" cstate="print">
             <a:extLst>
               <a:ext uri="{28A0092B-C50C-407E-A947-70E740481C1C}">
                 <a14:useLocalDpi xmlns:a14="http://schemas.microsoft.com/office/drawing/2010/main" val="0"/>
@@ -5028,7 +5021,7 @@
             <p:nvPr/>
           </p:nvPicPr>
           <p:blipFill>
-            <a:blip r:embed="rId4" cstate="email">
+            <a:blip r:embed="rId5" cstate="email">
               <a:extLst>
                 <a:ext uri="{28A0092B-C50C-407E-A947-70E740481C1C}">
                   <a14:useLocalDpi xmlns:a14="http://schemas.microsoft.com/office/drawing/2010/main"/>
@@ -5183,7 +5176,7 @@
             <p:nvPr/>
           </p:nvPicPr>
           <p:blipFill>
-            <a:blip r:embed="rId5" cstate="print">
+            <a:blip r:embed="rId6" cstate="print">
               <a:extLst>
                 <a:ext uri="{28A0092B-C50C-407E-A947-70E740481C1C}">
                   <a14:useLocalDpi xmlns:a14="http://schemas.microsoft.com/office/drawing/2010/main" val="0"/>
@@ -5215,6 +5208,92 @@
             </a:extLst>
           </p:spPr>
         </p:pic>
+      </p:grpSp>
+      <p:grpSp>
+        <p:nvGrpSpPr>
+          <p:cNvPr id="16" name="Grupa 15"/>
+          <p:cNvGrpSpPr/>
+          <p:nvPr/>
+        </p:nvGrpSpPr>
+        <p:grpSpPr>
+          <a:xfrm>
+            <a:off x="6113091" y="6178365"/>
+            <a:ext cx="2594896" cy="432078"/>
+            <a:chOff x="4715986" y="6209144"/>
+            <a:chExt cx="2948786" cy="432078"/>
+          </a:xfrm>
+        </p:grpSpPr>
+        <p:pic>
+          <p:nvPicPr>
+            <p:cNvPr id="17" name="Picture 8" descr="http://upload.wikimedia.org/wikipedia/commons/4/4e/Gmail_Icon.png"/>
+            <p:cNvPicPr>
+              <a:picLocks noChangeAspect="1" noChangeArrowheads="1"/>
+            </p:cNvPicPr>
+            <p:nvPr/>
+          </p:nvPicPr>
+          <p:blipFill>
+            <a:blip r:embed="rId5" cstate="email">
+              <a:extLst>
+                <a:ext uri="{28A0092B-C50C-407E-A947-70E740481C1C}">
+                  <a14:useLocalDpi xmlns:a14="http://schemas.microsoft.com/office/drawing/2010/main"/>
+                </a:ext>
+              </a:extLst>
+            </a:blip>
+            <a:srcRect/>
+            <a:stretch>
+              <a:fillRect/>
+            </a:stretch>
+          </p:blipFill>
+          <p:spPr bwMode="auto">
+            <a:xfrm>
+              <a:off x="4715986" y="6209144"/>
+              <a:ext cx="432078" cy="432078"/>
+            </a:xfrm>
+            <a:prstGeom prst="rect">
+              <a:avLst/>
+            </a:prstGeom>
+            <a:noFill/>
+            <a:extLst>
+              <a:ext uri="{909E8E84-426E-40DD-AFC4-6F175D3DCCD1}">
+                <a14:hiddenFill xmlns:a14="http://schemas.microsoft.com/office/drawing/2010/main">
+                  <a:solidFill>
+                    <a:srgbClr val="FFFFFF"/>
+                  </a:solidFill>
+                </a14:hiddenFill>
+              </a:ext>
+            </a:extLst>
+          </p:spPr>
+        </p:pic>
+        <p:sp>
+          <p:nvSpPr>
+            <p:cNvPr id="18" name="pole tekstowe 17"/>
+            <p:cNvSpPr txBox="1"/>
+            <p:nvPr/>
+          </p:nvSpPr>
+          <p:spPr>
+            <a:xfrm>
+              <a:off x="5074284" y="6240517"/>
+              <a:ext cx="2590488" cy="307777"/>
+            </a:xfrm>
+            <a:prstGeom prst="rect">
+              <a:avLst/>
+            </a:prstGeom>
+            <a:noFill/>
+          </p:spPr>
+          <p:txBody>
+            <a:bodyPr wrap="none" rtlCol="0">
+              <a:spAutoFit/>
+            </a:bodyPr>
+            <a:lstStyle/>
+            <a:p>
+              <a:r>
+                <a:rPr lang="pl-PL" sz="1400" smtClean="0"/>
+                <a:t>michal.lipski@pragmatists.pl</a:t>
+              </a:r>
+              <a:endParaRPr lang="pl-PL" sz="1400"/>
+            </a:p>
+          </p:txBody>
+        </p:sp>
       </p:grpSp>
     </p:spTree>
     <p:extLst>

</xml_diff>